<commit_message>
Finalisation notebooks 03 / 04 + pptx
</commit_message>
<xml_diff>
--- a/slides/03_04_mnist_basics.pptx
+++ b/slides/03_04_mnist_basics.pptx
@@ -125,7 +125,7 @@
 <file path=ppt/revisionInfo.xml><?xml version="1.0" encoding="utf-8"?>
 <p1510:revInfo xmlns:a="http://schemas.openxmlformats.org/drawingml/2006/main" xmlns:r="http://schemas.openxmlformats.org/officeDocument/2006/relationships" xmlns:p1510="http://schemas.microsoft.com/office/powerpoint/2015/10/main">
   <p1510:revLst>
-    <p1510:client id="{EEAA9421-7D29-4AE9-BD79-8FDD19F84FC2}" v="158" dt="2020-04-27T01:25:03.603"/>
+    <p1510:client id="{EEAA9421-7D29-4AE9-BD79-8FDD19F84FC2}" v="167" dt="2020-04-27T22:08:50.605"/>
   </p1510:revLst>
 </p1510:revInfo>
 </file>
@@ -1594,7 +1594,7 @@
   <pc:docChgLst>
     <pc:chgData name="Laurent Prud'hon" userId="196f0b5afced95ca" providerId="LiveId" clId="{EEAA9421-7D29-4AE9-BD79-8FDD19F84FC2}"/>
     <pc:docChg chg="undo redo custSel addSld delSld modSld sldOrd">
-      <pc:chgData name="Laurent Prud'hon" userId="196f0b5afced95ca" providerId="LiveId" clId="{EEAA9421-7D29-4AE9-BD79-8FDD19F84FC2}" dt="2020-04-27T01:26:18.154" v="3090" actId="1076"/>
+      <pc:chgData name="Laurent Prud'hon" userId="196f0b5afced95ca" providerId="LiveId" clId="{EEAA9421-7D29-4AE9-BD79-8FDD19F84FC2}" dt="2020-04-27T22:09:23.840" v="3135" actId="1076"/>
       <pc:docMkLst>
         <pc:docMk/>
       </pc:docMkLst>
@@ -2201,7 +2201,7 @@
         </pc:picChg>
       </pc:sldChg>
       <pc:sldChg chg="addSp delSp modSp add ord">
-        <pc:chgData name="Laurent Prud'hon" userId="196f0b5afced95ca" providerId="LiveId" clId="{EEAA9421-7D29-4AE9-BD79-8FDD19F84FC2}" dt="2020-04-26T09:36:51.083" v="2968" actId="1076"/>
+        <pc:chgData name="Laurent Prud'hon" userId="196f0b5afced95ca" providerId="LiveId" clId="{EEAA9421-7D29-4AE9-BD79-8FDD19F84FC2}" dt="2020-04-27T22:03:02.004" v="3109" actId="1076"/>
         <pc:sldMkLst>
           <pc:docMk/>
           <pc:sldMk cId="1279435209" sldId="302"/>
@@ -2279,11 +2279,51 @@
           </ac:picMkLst>
         </pc:picChg>
         <pc:picChg chg="add del mod">
+          <ac:chgData name="Laurent Prud'hon" userId="196f0b5afced95ca" providerId="LiveId" clId="{EEAA9421-7D29-4AE9-BD79-8FDD19F84FC2}" dt="2020-04-27T21:53:13.196" v="3094" actId="478"/>
+          <ac:picMkLst>
+            <pc:docMk/>
+            <pc:sldMk cId="1279435209" sldId="302"/>
+            <ac:picMk id="2" creationId="{1C4F123C-0195-4C9F-91F1-2C7A225B10E7}"/>
+          </ac:picMkLst>
+        </pc:picChg>
+        <pc:picChg chg="add mod">
+          <ac:chgData name="Laurent Prud'hon" userId="196f0b5afced95ca" providerId="LiveId" clId="{EEAA9421-7D29-4AE9-BD79-8FDD19F84FC2}" dt="2020-04-27T22:03:02.004" v="3109" actId="1076"/>
+          <ac:picMkLst>
+            <pc:docMk/>
+            <pc:sldMk cId="1279435209" sldId="302"/>
+            <ac:picMk id="3" creationId="{CA8147EC-E97A-49E0-AA1B-13EA264F1281}"/>
+          </ac:picMkLst>
+        </pc:picChg>
+        <pc:picChg chg="add del mod">
           <ac:chgData name="Laurent Prud'hon" userId="196f0b5afced95ca" providerId="LiveId" clId="{EEAA9421-7D29-4AE9-BD79-8FDD19F84FC2}" dt="2020-04-24T14:45:06.678" v="2171" actId="478"/>
           <ac:picMkLst>
             <pc:docMk/>
             <pc:sldMk cId="1279435209" sldId="302"/>
             <ac:picMk id="8" creationId="{5C0E6C81-0358-4891-B832-0B2442571BAC}"/>
+          </ac:picMkLst>
+        </pc:picChg>
+        <pc:picChg chg="add mod">
+          <ac:chgData name="Laurent Prud'hon" userId="196f0b5afced95ca" providerId="LiveId" clId="{EEAA9421-7D29-4AE9-BD79-8FDD19F84FC2}" dt="2020-04-27T21:59:58.376" v="3106" actId="1076"/>
+          <ac:picMkLst>
+            <pc:docMk/>
+            <pc:sldMk cId="1279435209" sldId="302"/>
+            <ac:picMk id="8" creationId="{E0656BBF-06F6-401C-9931-FE5D75EE5626}"/>
+          </ac:picMkLst>
+        </pc:picChg>
+        <pc:picChg chg="add mod">
+          <ac:chgData name="Laurent Prud'hon" userId="196f0b5afced95ca" providerId="LiveId" clId="{EEAA9421-7D29-4AE9-BD79-8FDD19F84FC2}" dt="2020-04-27T21:59:33.001" v="3103" actId="1076"/>
+          <ac:picMkLst>
+            <pc:docMk/>
+            <pc:sldMk cId="1279435209" sldId="302"/>
+            <ac:picMk id="9" creationId="{24BA8D06-F548-4E8D-A544-25AE358A5BE2}"/>
+          </ac:picMkLst>
+        </pc:picChg>
+        <pc:picChg chg="add mod">
+          <ac:chgData name="Laurent Prud'hon" userId="196f0b5afced95ca" providerId="LiveId" clId="{EEAA9421-7D29-4AE9-BD79-8FDD19F84FC2}" dt="2020-04-27T21:59:55.099" v="3105" actId="1076"/>
+          <ac:picMkLst>
+            <pc:docMk/>
+            <pc:sldMk cId="1279435209" sldId="302"/>
+            <ac:picMk id="10" creationId="{A9D29847-B7FC-4C3A-94C4-3354DE85A51B}"/>
           </ac:picMkLst>
         </pc:picChg>
         <pc:picChg chg="add del mod">
@@ -2302,8 +2342,8 @@
             <ac:picMk id="13" creationId="{B266045E-A2EA-43B7-9267-ECC3E74B65B8}"/>
           </ac:picMkLst>
         </pc:picChg>
-        <pc:picChg chg="add mod">
-          <ac:chgData name="Laurent Prud'hon" userId="196f0b5afced95ca" providerId="LiveId" clId="{EEAA9421-7D29-4AE9-BD79-8FDD19F84FC2}" dt="2020-04-24T14:45:51.922" v="2175" actId="1076"/>
+        <pc:picChg chg="add del mod">
+          <ac:chgData name="Laurent Prud'hon" userId="196f0b5afced95ca" providerId="LiveId" clId="{EEAA9421-7D29-4AE9-BD79-8FDD19F84FC2}" dt="2020-04-27T21:52:08.414" v="3091" actId="478"/>
           <ac:picMkLst>
             <pc:docMk/>
             <pc:sldMk cId="1279435209" sldId="302"/>
@@ -2334,8 +2374,8 @@
             <ac:picMk id="17" creationId="{9630C1A2-F889-4856-A844-BEDCA2D6886A}"/>
           </ac:picMkLst>
         </pc:picChg>
-        <pc:picChg chg="add mod">
-          <ac:chgData name="Laurent Prud'hon" userId="196f0b5afced95ca" providerId="LiveId" clId="{EEAA9421-7D29-4AE9-BD79-8FDD19F84FC2}" dt="2020-04-26T09:20:16.532" v="2957" actId="1076"/>
+        <pc:picChg chg="add del mod">
+          <ac:chgData name="Laurent Prud'hon" userId="196f0b5afced95ca" providerId="LiveId" clId="{EEAA9421-7D29-4AE9-BD79-8FDD19F84FC2}" dt="2020-04-27T21:59:09.530" v="3101" actId="478"/>
           <ac:picMkLst>
             <pc:docMk/>
             <pc:sldMk cId="1279435209" sldId="302"/>
@@ -2358,16 +2398,16 @@
             <ac:picMk id="20" creationId="{A9E77B6A-D083-4546-819B-3AD43B1A0267}"/>
           </ac:picMkLst>
         </pc:picChg>
-        <pc:picChg chg="add mod">
-          <ac:chgData name="Laurent Prud'hon" userId="196f0b5afced95ca" providerId="LiveId" clId="{EEAA9421-7D29-4AE9-BD79-8FDD19F84FC2}" dt="2020-04-26T09:36:22.407" v="2966" actId="1076"/>
+        <pc:picChg chg="add del mod">
+          <ac:chgData name="Laurent Prud'hon" userId="196f0b5afced95ca" providerId="LiveId" clId="{EEAA9421-7D29-4AE9-BD79-8FDD19F84FC2}" dt="2020-04-27T21:59:09.530" v="3101" actId="478"/>
           <ac:picMkLst>
             <pc:docMk/>
             <pc:sldMk cId="1279435209" sldId="302"/>
             <ac:picMk id="21" creationId="{F4F3DCD7-56C8-4F95-8753-3FF44A8FC927}"/>
           </ac:picMkLst>
         </pc:picChg>
-        <pc:picChg chg="add mod">
-          <ac:chgData name="Laurent Prud'hon" userId="196f0b5afced95ca" providerId="LiveId" clId="{EEAA9421-7D29-4AE9-BD79-8FDD19F84FC2}" dt="2020-04-26T09:36:51.083" v="2968" actId="1076"/>
+        <pc:picChg chg="add del mod">
+          <ac:chgData name="Laurent Prud'hon" userId="196f0b5afced95ca" providerId="LiveId" clId="{EEAA9421-7D29-4AE9-BD79-8FDD19F84FC2}" dt="2020-04-27T21:54:08.980" v="3097" actId="478"/>
           <ac:picMkLst>
             <pc:docMk/>
             <pc:sldMk cId="1279435209" sldId="302"/>
@@ -2375,8 +2415,8 @@
           </ac:picMkLst>
         </pc:picChg>
       </pc:sldChg>
-      <pc:sldChg chg="addSp modSp add ord">
-        <pc:chgData name="Laurent Prud'hon" userId="196f0b5afced95ca" providerId="LiveId" clId="{EEAA9421-7D29-4AE9-BD79-8FDD19F84FC2}" dt="2020-04-27T01:23:57.302" v="3055" actId="1076"/>
+      <pc:sldChg chg="addSp delSp modSp add ord">
+        <pc:chgData name="Laurent Prud'hon" userId="196f0b5afced95ca" providerId="LiveId" clId="{EEAA9421-7D29-4AE9-BD79-8FDD19F84FC2}" dt="2020-04-27T22:03:54.037" v="3114" actId="1076"/>
         <pc:sldMkLst>
           <pc:docMk/>
           <pc:sldMk cId="1887019503" sldId="303"/>
@@ -2437,8 +2477,8 @@
             <ac:picMk id="8" creationId="{0396A797-E894-4DB2-8C44-8577E482FF4A}"/>
           </ac:picMkLst>
         </pc:picChg>
-        <pc:picChg chg="add mod">
-          <ac:chgData name="Laurent Prud'hon" userId="196f0b5afced95ca" providerId="LiveId" clId="{EEAA9421-7D29-4AE9-BD79-8FDD19F84FC2}" dt="2020-04-25T13:09:45.865" v="2809" actId="1076"/>
+        <pc:picChg chg="add del mod">
+          <ac:chgData name="Laurent Prud'hon" userId="196f0b5afced95ca" providerId="LiveId" clId="{EEAA9421-7D29-4AE9-BD79-8FDD19F84FC2}" dt="2020-04-27T22:03:19.077" v="3110" actId="478"/>
           <ac:picMkLst>
             <pc:docMk/>
             <pc:sldMk cId="1887019503" sldId="303"/>
@@ -2451,6 +2491,22 @@
             <pc:docMk/>
             <pc:sldMk cId="1887019503" sldId="303"/>
             <ac:picMk id="10" creationId="{5A6D4EDA-C682-4A33-B1A2-96F4007C0F32}"/>
+          </ac:picMkLst>
+        </pc:picChg>
+        <pc:picChg chg="add mod">
+          <ac:chgData name="Laurent Prud'hon" userId="196f0b5afced95ca" providerId="LiveId" clId="{EEAA9421-7D29-4AE9-BD79-8FDD19F84FC2}" dt="2020-04-27T22:03:28.067" v="3112" actId="1076"/>
+          <ac:picMkLst>
+            <pc:docMk/>
+            <pc:sldMk cId="1887019503" sldId="303"/>
+            <ac:picMk id="11" creationId="{A27ECA69-C5BD-47E3-9A35-D97090AAFC5F}"/>
+          </ac:picMkLst>
+        </pc:picChg>
+        <pc:picChg chg="add mod">
+          <ac:chgData name="Laurent Prud'hon" userId="196f0b5afced95ca" providerId="LiveId" clId="{EEAA9421-7D29-4AE9-BD79-8FDD19F84FC2}" dt="2020-04-27T22:03:54.037" v="3114" actId="1076"/>
+          <ac:picMkLst>
+            <pc:docMk/>
+            <pc:sldMk cId="1887019503" sldId="303"/>
+            <ac:picMk id="12" creationId="{C8BB86F1-3F58-4E32-BD06-0DE1BB175713}"/>
           </ac:picMkLst>
         </pc:picChg>
       </pc:sldChg>
@@ -2896,7 +2952,7 @@
         </pc:cxnChg>
       </pc:sldChg>
       <pc:sldChg chg="addSp delSp modSp add">
-        <pc:chgData name="Laurent Prud'hon" userId="196f0b5afced95ca" providerId="LiveId" clId="{EEAA9421-7D29-4AE9-BD79-8FDD19F84FC2}" dt="2020-04-27T01:24:40.466" v="3063" actId="1076"/>
+        <pc:chgData name="Laurent Prud'hon" userId="196f0b5afced95ca" providerId="LiveId" clId="{EEAA9421-7D29-4AE9-BD79-8FDD19F84FC2}" dt="2020-04-27T22:07:27.457" v="3124" actId="1076"/>
         <pc:sldMkLst>
           <pc:docMk/>
           <pc:sldMk cId="111559839" sldId="306"/>
@@ -2926,7 +2982,15 @@
           </ac:picMkLst>
         </pc:picChg>
         <pc:picChg chg="add mod">
-          <ac:chgData name="Laurent Prud'hon" userId="196f0b5afced95ca" providerId="LiveId" clId="{EEAA9421-7D29-4AE9-BD79-8FDD19F84FC2}" dt="2020-04-27T01:20:56.124" v="3036" actId="1076"/>
+          <ac:chgData name="Laurent Prud'hon" userId="196f0b5afced95ca" providerId="LiveId" clId="{EEAA9421-7D29-4AE9-BD79-8FDD19F84FC2}" dt="2020-04-27T22:07:13.518" v="3123" actId="1076"/>
+          <ac:picMkLst>
+            <pc:docMk/>
+            <pc:sldMk cId="111559839" sldId="306"/>
+            <ac:picMk id="2" creationId="{54FF0420-4105-4FDB-9BF4-0A4CC83C6F7B}"/>
+          </ac:picMkLst>
+        </pc:picChg>
+        <pc:picChg chg="add mod">
+          <ac:chgData name="Laurent Prud'hon" userId="196f0b5afced95ca" providerId="LiveId" clId="{EEAA9421-7D29-4AE9-BD79-8FDD19F84FC2}" dt="2020-04-27T22:06:37.040" v="3118" actId="1076"/>
           <ac:picMkLst>
             <pc:docMk/>
             <pc:sldMk cId="111559839" sldId="306"/>
@@ -2934,7 +2998,7 @@
           </ac:picMkLst>
         </pc:picChg>
         <pc:picChg chg="add mod">
-          <ac:chgData name="Laurent Prud'hon" userId="196f0b5afced95ca" providerId="LiveId" clId="{EEAA9421-7D29-4AE9-BD79-8FDD19F84FC2}" dt="2020-04-27T01:20:58.997" v="3037" actId="1076"/>
+          <ac:chgData name="Laurent Prud'hon" userId="196f0b5afced95ca" providerId="LiveId" clId="{EEAA9421-7D29-4AE9-BD79-8FDD19F84FC2}" dt="2020-04-27T22:07:27.457" v="3124" actId="1076"/>
           <ac:picMkLst>
             <pc:docMk/>
             <pc:sldMk cId="111559839" sldId="306"/>
@@ -2973,8 +3037,8 @@
             <ac:picMk id="10" creationId="{82CF5BFD-00FE-4332-A5DA-3B1DDBE332F3}"/>
           </ac:picMkLst>
         </pc:picChg>
-        <pc:picChg chg="add mod">
-          <ac:chgData name="Laurent Prud'hon" userId="196f0b5afced95ca" providerId="LiveId" clId="{EEAA9421-7D29-4AE9-BD79-8FDD19F84FC2}" dt="2020-04-27T01:24:38.765" v="3062" actId="1076"/>
+        <pc:picChg chg="add del mod">
+          <ac:chgData name="Laurent Prud'hon" userId="196f0b5afced95ca" providerId="LiveId" clId="{EEAA9421-7D29-4AE9-BD79-8FDD19F84FC2}" dt="2020-04-27T22:04:40.409" v="3115" actId="478"/>
           <ac:picMkLst>
             <pc:docMk/>
             <pc:sldMk cId="111559839" sldId="306"/>
@@ -3035,8 +3099,8 @@
           <pc:sldMk cId="950013450" sldId="307"/>
         </pc:sldMkLst>
       </pc:sldChg>
-      <pc:sldChg chg="addSp modSp add">
-        <pc:chgData name="Laurent Prud'hon" userId="196f0b5afced95ca" providerId="LiveId" clId="{EEAA9421-7D29-4AE9-BD79-8FDD19F84FC2}" dt="2020-04-27T01:26:18.154" v="3090" actId="1076"/>
+      <pc:sldChg chg="addSp delSp modSp add">
+        <pc:chgData name="Laurent Prud'hon" userId="196f0b5afced95ca" providerId="LiveId" clId="{EEAA9421-7D29-4AE9-BD79-8FDD19F84FC2}" dt="2020-04-27T22:09:23.840" v="3135" actId="1076"/>
         <pc:sldMkLst>
           <pc:docMk/>
           <pc:sldMk cId="4180827950" sldId="307"/>
@@ -3058,7 +3122,7 @@
           </ac:spMkLst>
         </pc:spChg>
         <pc:spChg chg="add mod">
-          <ac:chgData name="Laurent Prud'hon" userId="196f0b5afced95ca" providerId="LiveId" clId="{EEAA9421-7D29-4AE9-BD79-8FDD19F84FC2}" dt="2020-04-27T01:26:18.154" v="3090" actId="1076"/>
+          <ac:chgData name="Laurent Prud'hon" userId="196f0b5afced95ca" providerId="LiveId" clId="{EEAA9421-7D29-4AE9-BD79-8FDD19F84FC2}" dt="2020-04-27T22:09:23.840" v="3135" actId="1076"/>
           <ac:spMkLst>
             <pc:docMk/>
             <pc:sldMk cId="4180827950" sldId="307"/>
@@ -3066,7 +3130,7 @@
           </ac:spMkLst>
         </pc:spChg>
         <pc:picChg chg="add mod">
-          <ac:chgData name="Laurent Prud'hon" userId="196f0b5afced95ca" providerId="LiveId" clId="{EEAA9421-7D29-4AE9-BD79-8FDD19F84FC2}" dt="2020-04-27T01:23:11.939" v="3053" actId="1076"/>
+          <ac:chgData name="Laurent Prud'hon" userId="196f0b5afced95ca" providerId="LiveId" clId="{EEAA9421-7D29-4AE9-BD79-8FDD19F84FC2}" dt="2020-04-27T22:08:58.313" v="3130" actId="1076"/>
           <ac:picMkLst>
             <pc:docMk/>
             <pc:sldMk cId="4180827950" sldId="307"/>
@@ -3074,7 +3138,7 @@
           </ac:picMkLst>
         </pc:picChg>
         <pc:picChg chg="add mod">
-          <ac:chgData name="Laurent Prud'hon" userId="196f0b5afced95ca" providerId="LiveId" clId="{EEAA9421-7D29-4AE9-BD79-8FDD19F84FC2}" dt="2020-04-27T01:23:11.939" v="3053" actId="1076"/>
+          <ac:chgData name="Laurent Prud'hon" userId="196f0b5afced95ca" providerId="LiveId" clId="{EEAA9421-7D29-4AE9-BD79-8FDD19F84FC2}" dt="2020-04-27T22:09:00.250" v="3131" actId="1076"/>
           <ac:picMkLst>
             <pc:docMk/>
             <pc:sldMk cId="4180827950" sldId="307"/>
@@ -3082,15 +3146,15 @@
           </ac:picMkLst>
         </pc:picChg>
         <pc:picChg chg="add mod">
-          <ac:chgData name="Laurent Prud'hon" userId="196f0b5afced95ca" providerId="LiveId" clId="{EEAA9421-7D29-4AE9-BD79-8FDD19F84FC2}" dt="2020-04-27T01:26:05.835" v="3088" actId="1076"/>
+          <ac:chgData name="Laurent Prud'hon" userId="196f0b5afced95ca" providerId="LiveId" clId="{EEAA9421-7D29-4AE9-BD79-8FDD19F84FC2}" dt="2020-04-27T22:09:03.701" v="3132" actId="1076"/>
           <ac:picMkLst>
             <pc:docMk/>
             <pc:sldMk cId="4180827950" sldId="307"/>
             <ac:picMk id="6" creationId="{F2BC170D-FD8A-445A-B9B1-846A1EB145C8}"/>
           </ac:picMkLst>
         </pc:picChg>
-        <pc:picChg chg="add mod">
-          <ac:chgData name="Laurent Prud'hon" userId="196f0b5afced95ca" providerId="LiveId" clId="{EEAA9421-7D29-4AE9-BD79-8FDD19F84FC2}" dt="2020-04-27T01:23:11.939" v="3053" actId="1076"/>
+        <pc:picChg chg="add del mod">
+          <ac:chgData name="Laurent Prud'hon" userId="196f0b5afced95ca" providerId="LiveId" clId="{EEAA9421-7D29-4AE9-BD79-8FDD19F84FC2}" dt="2020-04-27T22:08:01.294" v="3125" actId="478"/>
           <ac:picMkLst>
             <pc:docMk/>
             <pc:sldMk cId="4180827950" sldId="307"/>
@@ -3098,7 +3162,7 @@
           </ac:picMkLst>
         </pc:picChg>
         <pc:picChg chg="add mod">
-          <ac:chgData name="Laurent Prud'hon" userId="196f0b5afced95ca" providerId="LiveId" clId="{EEAA9421-7D29-4AE9-BD79-8FDD19F84FC2}" dt="2020-04-27T01:26:08.724" v="3089" actId="1076"/>
+          <ac:chgData name="Laurent Prud'hon" userId="196f0b5afced95ca" providerId="LiveId" clId="{EEAA9421-7D29-4AE9-BD79-8FDD19F84FC2}" dt="2020-04-27T22:09:12.143" v="3133" actId="1076"/>
           <ac:picMkLst>
             <pc:docMk/>
             <pc:sldMk cId="4180827950" sldId="307"/>
@@ -3106,11 +3170,19 @@
           </ac:picMkLst>
         </pc:picChg>
         <pc:picChg chg="add mod">
-          <ac:chgData name="Laurent Prud'hon" userId="196f0b5afced95ca" providerId="LiveId" clId="{EEAA9421-7D29-4AE9-BD79-8FDD19F84FC2}" dt="2020-04-27T01:26:18.154" v="3090" actId="1076"/>
+          <ac:chgData name="Laurent Prud'hon" userId="196f0b5afced95ca" providerId="LiveId" clId="{EEAA9421-7D29-4AE9-BD79-8FDD19F84FC2}" dt="2020-04-27T22:09:23.840" v="3135" actId="1076"/>
           <ac:picMkLst>
             <pc:docMk/>
             <pc:sldMk cId="4180827950" sldId="307"/>
             <ac:picMk id="9" creationId="{EFA47BAD-B0F6-4ECD-9CCB-022E9F1823EA}"/>
+          </ac:picMkLst>
+        </pc:picChg>
+        <pc:picChg chg="add mod">
+          <ac:chgData name="Laurent Prud'hon" userId="196f0b5afced95ca" providerId="LiveId" clId="{EEAA9421-7D29-4AE9-BD79-8FDD19F84FC2}" dt="2020-04-27T22:09:14.689" v="3134" actId="1076"/>
+          <ac:picMkLst>
+            <pc:docMk/>
+            <pc:sldMk cId="4180827950" sldId="307"/>
+            <ac:picMk id="11" creationId="{1F85CD7F-201A-428E-BAAB-E0744604650C}"/>
           </ac:picMkLst>
         </pc:picChg>
       </pc:sldChg>
@@ -6559,7 +6631,7 @@
         </p:blipFill>
         <p:spPr>
           <a:xfrm>
-            <a:off x="6980236" y="1873696"/>
+            <a:off x="1293359" y="5623998"/>
             <a:ext cx="3724275" cy="876300"/>
           </a:xfrm>
           <a:prstGeom prst="rect">
@@ -6589,7 +6661,7 @@
         </p:blipFill>
         <p:spPr>
           <a:xfrm>
-            <a:off x="6980236" y="3080974"/>
+            <a:off x="7208384" y="2529385"/>
             <a:ext cx="4648200" cy="2286000"/>
           </a:xfrm>
           <a:prstGeom prst="rect">
@@ -6659,10 +6731,10 @@
       </p:pic>
       <p:pic>
         <p:nvPicPr>
-          <p:cNvPr id="11" name="Image 10">
-            <a:extLst>
-              <a:ext uri="{FF2B5EF4-FFF2-40B4-BE49-F238E27FC236}">
-                <a16:creationId xmlns:a16="http://schemas.microsoft.com/office/drawing/2014/main" id="{D4CD1BB0-DBB6-4B82-A6BD-A8F92749A859}"/>
+          <p:cNvPr id="13" name="Image 12">
+            <a:extLst>
+              <a:ext uri="{FF2B5EF4-FFF2-40B4-BE49-F238E27FC236}">
+                <a16:creationId xmlns:a16="http://schemas.microsoft.com/office/drawing/2014/main" id="{1E1967F3-EA88-4B54-AEEE-8533A436AE64}"/>
               </a:ext>
             </a:extLst>
           </p:cNvPr>
@@ -6673,36 +6745,6 @@
         </p:nvPicPr>
         <p:blipFill>
           <a:blip r:embed="rId6"/>
-          <a:stretch>
-            <a:fillRect/>
-          </a:stretch>
-        </p:blipFill>
-        <p:spPr>
-          <a:xfrm>
-            <a:off x="1293359" y="5654622"/>
-            <a:ext cx="5391150" cy="647700"/>
-          </a:xfrm>
-          <a:prstGeom prst="rect">
-            <a:avLst/>
-          </a:prstGeom>
-        </p:spPr>
-      </p:pic>
-      <p:pic>
-        <p:nvPicPr>
-          <p:cNvPr id="13" name="Image 12">
-            <a:extLst>
-              <a:ext uri="{FF2B5EF4-FFF2-40B4-BE49-F238E27FC236}">
-                <a16:creationId xmlns:a16="http://schemas.microsoft.com/office/drawing/2014/main" id="{1E1967F3-EA88-4B54-AEEE-8533A436AE64}"/>
-              </a:ext>
-            </a:extLst>
-          </p:cNvPr>
-          <p:cNvPicPr>
-            <a:picLocks noChangeAspect="1"/>
-          </p:cNvPicPr>
-          <p:nvPr/>
-        </p:nvPicPr>
-        <p:blipFill>
-          <a:blip r:embed="rId7"/>
           <a:stretch>
             <a:fillRect/>
           </a:stretch>
@@ -6732,7 +6774,7 @@
           <p:nvPr/>
         </p:nvPicPr>
         <p:blipFill>
-          <a:blip r:embed="rId8"/>
+          <a:blip r:embed="rId7"/>
           <a:stretch>
             <a:fillRect/>
           </a:stretch>
@@ -6762,7 +6804,7 @@
           <p:nvPr/>
         </p:nvPicPr>
         <p:blipFill>
-          <a:blip r:embed="rId9"/>
+          <a:blip r:embed="rId8"/>
           <a:stretch>
             <a:fillRect/>
           </a:stretch>
@@ -6771,6 +6813,36 @@
           <a:xfrm>
             <a:off x="4316897" y="2446040"/>
             <a:ext cx="1647825" cy="266700"/>
+          </a:xfrm>
+          <a:prstGeom prst="rect">
+            <a:avLst/>
+          </a:prstGeom>
+        </p:spPr>
+      </p:pic>
+      <p:pic>
+        <p:nvPicPr>
+          <p:cNvPr id="2" name="Image 1">
+            <a:extLst>
+              <a:ext uri="{FF2B5EF4-FFF2-40B4-BE49-F238E27FC236}">
+                <a16:creationId xmlns:a16="http://schemas.microsoft.com/office/drawing/2014/main" id="{54FF0420-4105-4FDB-9BF4-0A4CC83C6F7B}"/>
+              </a:ext>
+            </a:extLst>
+          </p:cNvPr>
+          <p:cNvPicPr>
+            <a:picLocks noChangeAspect="1"/>
+          </p:cNvPicPr>
+          <p:nvPr/>
+        </p:nvPicPr>
+        <p:blipFill>
+          <a:blip r:embed="rId9"/>
+          <a:stretch>
+            <a:fillRect/>
+          </a:stretch>
+        </p:blipFill>
+        <p:spPr>
+          <a:xfrm>
+            <a:off x="6446384" y="5233271"/>
+            <a:ext cx="5410200" cy="1171575"/>
           </a:xfrm>
           <a:prstGeom prst="rect">
             <a:avLst/>
@@ -6921,7 +6993,7 @@
         </p:blipFill>
         <p:spPr>
           <a:xfrm>
-            <a:off x="1328283" y="1922915"/>
+            <a:off x="1328283" y="1372247"/>
             <a:ext cx="2162175" cy="428625"/>
           </a:xfrm>
           <a:prstGeom prst="rect">
@@ -6951,7 +7023,7 @@
         </p:blipFill>
         <p:spPr>
           <a:xfrm>
-            <a:off x="1328283" y="2620837"/>
+            <a:off x="1328283" y="2086379"/>
             <a:ext cx="3114675" cy="371475"/>
           </a:xfrm>
           <a:prstGeom prst="rect">
@@ -6981,7 +7053,7 @@
         </p:blipFill>
         <p:spPr>
           <a:xfrm>
-            <a:off x="1328283" y="4374220"/>
+            <a:off x="1328283" y="2743361"/>
             <a:ext cx="4314825" cy="561975"/>
           </a:xfrm>
           <a:prstGeom prst="rect">
@@ -6991,10 +7063,10 @@
       </p:pic>
       <p:pic>
         <p:nvPicPr>
-          <p:cNvPr id="7" name="Image 6">
-            <a:extLst>
-              <a:ext uri="{FF2B5EF4-FFF2-40B4-BE49-F238E27FC236}">
-                <a16:creationId xmlns:a16="http://schemas.microsoft.com/office/drawing/2014/main" id="{6FAC77DF-273B-438D-88A3-44A898E0A717}"/>
+          <p:cNvPr id="8" name="Image 7">
+            <a:extLst>
+              <a:ext uri="{FF2B5EF4-FFF2-40B4-BE49-F238E27FC236}">
+                <a16:creationId xmlns:a16="http://schemas.microsoft.com/office/drawing/2014/main" id="{767056C7-5BFD-4EAB-AE3A-7F3B84A41EB4}"/>
               </a:ext>
             </a:extLst>
           </p:cNvPr>
@@ -7011,8 +7083,8 @@
         </p:blipFill>
         <p:spPr>
           <a:xfrm>
-            <a:off x="1328283" y="3346850"/>
-            <a:ext cx="2838450" cy="419100"/>
+            <a:off x="1354362" y="3590843"/>
+            <a:ext cx="1714500" cy="381000"/>
           </a:xfrm>
           <a:prstGeom prst="rect">
             <a:avLst/>
@@ -7021,10 +7093,10 @@
       </p:pic>
       <p:pic>
         <p:nvPicPr>
-          <p:cNvPr id="8" name="Image 7">
-            <a:extLst>
-              <a:ext uri="{FF2B5EF4-FFF2-40B4-BE49-F238E27FC236}">
-                <a16:creationId xmlns:a16="http://schemas.microsoft.com/office/drawing/2014/main" id="{767056C7-5BFD-4EAB-AE3A-7F3B84A41EB4}"/>
+          <p:cNvPr id="9" name="Image 8">
+            <a:extLst>
+              <a:ext uri="{FF2B5EF4-FFF2-40B4-BE49-F238E27FC236}">
+                <a16:creationId xmlns:a16="http://schemas.microsoft.com/office/drawing/2014/main" id="{EFA47BAD-B0F6-4ECD-9CCB-022E9F1823EA}"/>
               </a:ext>
             </a:extLst>
           </p:cNvPr>
@@ -7041,20 +7113,55 @@
         </p:blipFill>
         <p:spPr>
           <a:xfrm>
-            <a:off x="1328283" y="5246673"/>
-            <a:ext cx="1714500" cy="381000"/>
+            <a:off x="7159172" y="2470922"/>
+            <a:ext cx="2286000" cy="1019175"/>
           </a:xfrm>
           <a:prstGeom prst="rect">
             <a:avLst/>
           </a:prstGeom>
         </p:spPr>
       </p:pic>
+      <p:sp>
+        <p:nvSpPr>
+          <p:cNvPr id="10" name="ZoneTexte 9">
+            <a:extLst>
+              <a:ext uri="{FF2B5EF4-FFF2-40B4-BE49-F238E27FC236}">
+                <a16:creationId xmlns:a16="http://schemas.microsoft.com/office/drawing/2014/main" id="{486C14C0-38B2-4061-A3B1-2EA6F98E131A}"/>
+              </a:ext>
+            </a:extLst>
+          </p:cNvPr>
+          <p:cNvSpPr txBox="1"/>
+          <p:nvPr/>
+        </p:nvSpPr>
+        <p:spPr>
+          <a:xfrm>
+            <a:off x="7159172" y="1717047"/>
+            <a:ext cx="2110065" cy="369332"/>
+          </a:xfrm>
+          <a:prstGeom prst="rect">
+            <a:avLst/>
+          </a:prstGeom>
+          <a:noFill/>
+        </p:spPr>
+        <p:txBody>
+          <a:bodyPr wrap="none" rtlCol="0">
+            <a:spAutoFit/>
+          </a:bodyPr>
+          <a:lstStyle/>
+          <a:p>
+            <a:r>
+              <a:rPr lang="fr-FR" b="1" dirty="0"/>
+              <a:t>Réseau de neurones</a:t>
+            </a:r>
+          </a:p>
+        </p:txBody>
+      </p:sp>
       <p:pic>
         <p:nvPicPr>
-          <p:cNvPr id="9" name="Image 8">
-            <a:extLst>
-              <a:ext uri="{FF2B5EF4-FFF2-40B4-BE49-F238E27FC236}">
-                <a16:creationId xmlns:a16="http://schemas.microsoft.com/office/drawing/2014/main" id="{EFA47BAD-B0F6-4ECD-9CCB-022E9F1823EA}"/>
+          <p:cNvPr id="11" name="Image 10">
+            <a:extLst>
+              <a:ext uri="{FF2B5EF4-FFF2-40B4-BE49-F238E27FC236}">
+                <a16:creationId xmlns:a16="http://schemas.microsoft.com/office/drawing/2014/main" id="{1F85CD7F-201A-428E-BAAB-E0744604650C}"/>
               </a:ext>
             </a:extLst>
           </p:cNvPr>
@@ -7071,49 +7178,14 @@
         </p:blipFill>
         <p:spPr>
           <a:xfrm>
-            <a:off x="7275286" y="2598909"/>
-            <a:ext cx="2286000" cy="1019175"/>
+            <a:off x="1354362" y="4257350"/>
+            <a:ext cx="2876550" cy="1962150"/>
           </a:xfrm>
           <a:prstGeom prst="rect">
             <a:avLst/>
           </a:prstGeom>
         </p:spPr>
       </p:pic>
-      <p:sp>
-        <p:nvSpPr>
-          <p:cNvPr id="10" name="ZoneTexte 9">
-            <a:extLst>
-              <a:ext uri="{FF2B5EF4-FFF2-40B4-BE49-F238E27FC236}">
-                <a16:creationId xmlns:a16="http://schemas.microsoft.com/office/drawing/2014/main" id="{486C14C0-38B2-4061-A3B1-2EA6F98E131A}"/>
-              </a:ext>
-            </a:extLst>
-          </p:cNvPr>
-          <p:cNvSpPr txBox="1"/>
-          <p:nvPr/>
-        </p:nvSpPr>
-        <p:spPr>
-          <a:xfrm>
-            <a:off x="7275286" y="1845034"/>
-            <a:ext cx="2110065" cy="369332"/>
-          </a:xfrm>
-          <a:prstGeom prst="rect">
-            <a:avLst/>
-          </a:prstGeom>
-          <a:noFill/>
-        </p:spPr>
-        <p:txBody>
-          <a:bodyPr wrap="none" rtlCol="0">
-            <a:spAutoFit/>
-          </a:bodyPr>
-          <a:lstStyle/>
-          <a:p>
-            <a:r>
-              <a:rPr lang="fr-FR" b="1" dirty="0"/>
-              <a:t>Réseau de neurones</a:t>
-            </a:r>
-          </a:p>
-        </p:txBody>
-      </p:sp>
     </p:spTree>
     <p:extLst>
       <p:ext uri="{BB962C8B-B14F-4D97-AF65-F5344CB8AC3E}">
@@ -12695,10 +12767,10 @@
       </p:pic>
       <p:pic>
         <p:nvPicPr>
-          <p:cNvPr id="14" name="Image 13">
-            <a:extLst>
-              <a:ext uri="{FF2B5EF4-FFF2-40B4-BE49-F238E27FC236}">
-                <a16:creationId xmlns:a16="http://schemas.microsoft.com/office/drawing/2014/main" id="{223781B5-34A0-4100-B1E1-A523B32EEE2A}"/>
+          <p:cNvPr id="20" name="Image 19">
+            <a:extLst>
+              <a:ext uri="{FF2B5EF4-FFF2-40B4-BE49-F238E27FC236}">
+                <a16:creationId xmlns:a16="http://schemas.microsoft.com/office/drawing/2014/main" id="{A9E77B6A-D083-4546-819B-3AD43B1A0267}"/>
               </a:ext>
             </a:extLst>
           </p:cNvPr>
@@ -12709,66 +12781,6 @@
         </p:nvPicPr>
         <p:blipFill>
           <a:blip r:embed="rId3"/>
-          <a:stretch>
-            <a:fillRect/>
-          </a:stretch>
-        </p:blipFill>
-        <p:spPr>
-          <a:xfrm>
-            <a:off x="5152645" y="1659123"/>
-            <a:ext cx="3343275" cy="1228725"/>
-          </a:xfrm>
-          <a:prstGeom prst="rect">
-            <a:avLst/>
-          </a:prstGeom>
-        </p:spPr>
-      </p:pic>
-      <p:pic>
-        <p:nvPicPr>
-          <p:cNvPr id="18" name="Image 17">
-            <a:extLst>
-              <a:ext uri="{FF2B5EF4-FFF2-40B4-BE49-F238E27FC236}">
-                <a16:creationId xmlns:a16="http://schemas.microsoft.com/office/drawing/2014/main" id="{A098DCFE-A40E-4477-8C25-ABE59F6FB1AA}"/>
-              </a:ext>
-            </a:extLst>
-          </p:cNvPr>
-          <p:cNvPicPr>
-            <a:picLocks noChangeAspect="1"/>
-          </p:cNvPicPr>
-          <p:nvPr/>
-        </p:nvPicPr>
-        <p:blipFill>
-          <a:blip r:embed="rId4"/>
-          <a:stretch>
-            <a:fillRect/>
-          </a:stretch>
-        </p:blipFill>
-        <p:spPr>
-          <a:xfrm>
-            <a:off x="1268803" y="5118727"/>
-            <a:ext cx="5572125" cy="390525"/>
-          </a:xfrm>
-          <a:prstGeom prst="rect">
-            <a:avLst/>
-          </a:prstGeom>
-        </p:spPr>
-      </p:pic>
-      <p:pic>
-        <p:nvPicPr>
-          <p:cNvPr id="20" name="Image 19">
-            <a:extLst>
-              <a:ext uri="{FF2B5EF4-FFF2-40B4-BE49-F238E27FC236}">
-                <a16:creationId xmlns:a16="http://schemas.microsoft.com/office/drawing/2014/main" id="{A9E77B6A-D083-4546-819B-3AD43B1A0267}"/>
-              </a:ext>
-            </a:extLst>
-          </p:cNvPr>
-          <p:cNvPicPr>
-            <a:picLocks noChangeAspect="1"/>
-          </p:cNvPicPr>
-          <p:nvPr/>
-        </p:nvPicPr>
-        <p:blipFill>
-          <a:blip r:embed="rId5"/>
           <a:stretch>
             <a:fillRect/>
           </a:stretch>
@@ -12785,10 +12797,70 @@
       </p:pic>
       <p:pic>
         <p:nvPicPr>
-          <p:cNvPr id="21" name="Image 20">
-            <a:extLst>
-              <a:ext uri="{FF2B5EF4-FFF2-40B4-BE49-F238E27FC236}">
-                <a16:creationId xmlns:a16="http://schemas.microsoft.com/office/drawing/2014/main" id="{F4F3DCD7-56C8-4F95-8753-3FF44A8FC927}"/>
+          <p:cNvPr id="3" name="Image 2">
+            <a:extLst>
+              <a:ext uri="{FF2B5EF4-FFF2-40B4-BE49-F238E27FC236}">
+                <a16:creationId xmlns:a16="http://schemas.microsoft.com/office/drawing/2014/main" id="{CA8147EC-E97A-49E0-AA1B-13EA264F1281}"/>
+              </a:ext>
+            </a:extLst>
+          </p:cNvPr>
+          <p:cNvPicPr>
+            <a:picLocks noChangeAspect="1"/>
+          </p:cNvPicPr>
+          <p:nvPr/>
+        </p:nvPicPr>
+        <p:blipFill>
+          <a:blip r:embed="rId4"/>
+          <a:stretch>
+            <a:fillRect/>
+          </a:stretch>
+        </p:blipFill>
+        <p:spPr>
+          <a:xfrm>
+            <a:off x="6096000" y="1850553"/>
+            <a:ext cx="3914775" cy="885825"/>
+          </a:xfrm>
+          <a:prstGeom prst="rect">
+            <a:avLst/>
+          </a:prstGeom>
+        </p:spPr>
+      </p:pic>
+      <p:pic>
+        <p:nvPicPr>
+          <p:cNvPr id="8" name="Image 7">
+            <a:extLst>
+              <a:ext uri="{FF2B5EF4-FFF2-40B4-BE49-F238E27FC236}">
+                <a16:creationId xmlns:a16="http://schemas.microsoft.com/office/drawing/2014/main" id="{E0656BBF-06F6-401C-9931-FE5D75EE5626}"/>
+              </a:ext>
+            </a:extLst>
+          </p:cNvPr>
+          <p:cNvPicPr>
+            <a:picLocks noChangeAspect="1"/>
+          </p:cNvPicPr>
+          <p:nvPr/>
+        </p:nvPicPr>
+        <p:blipFill>
+          <a:blip r:embed="rId5"/>
+          <a:stretch>
+            <a:fillRect/>
+          </a:stretch>
+        </p:blipFill>
+        <p:spPr>
+          <a:xfrm>
+            <a:off x="6096000" y="4574989"/>
+            <a:ext cx="4124325" cy="1152525"/>
+          </a:xfrm>
+          <a:prstGeom prst="rect">
+            <a:avLst/>
+          </a:prstGeom>
+        </p:spPr>
+      </p:pic>
+      <p:pic>
+        <p:nvPicPr>
+          <p:cNvPr id="9" name="Image 8">
+            <a:extLst>
+              <a:ext uri="{FF2B5EF4-FFF2-40B4-BE49-F238E27FC236}">
+                <a16:creationId xmlns:a16="http://schemas.microsoft.com/office/drawing/2014/main" id="{24BA8D06-F548-4E8D-A544-25AE358A5BE2}"/>
               </a:ext>
             </a:extLst>
           </p:cNvPr>
@@ -12805,8 +12877,8 @@
         </p:blipFill>
         <p:spPr>
           <a:xfrm>
-            <a:off x="1266613" y="4663329"/>
-            <a:ext cx="4086225" cy="200025"/>
+            <a:off x="1266613" y="4734162"/>
+            <a:ext cx="3533775" cy="238125"/>
           </a:xfrm>
           <a:prstGeom prst="rect">
             <a:avLst/>
@@ -12815,10 +12887,10 @@
       </p:pic>
       <p:pic>
         <p:nvPicPr>
-          <p:cNvPr id="22" name="Image 21">
-            <a:extLst>
-              <a:ext uri="{FF2B5EF4-FFF2-40B4-BE49-F238E27FC236}">
-                <a16:creationId xmlns:a16="http://schemas.microsoft.com/office/drawing/2014/main" id="{ABC4A800-720D-467E-9805-86B0E5151196}"/>
+          <p:cNvPr id="10" name="Image 9">
+            <a:extLst>
+              <a:ext uri="{FF2B5EF4-FFF2-40B4-BE49-F238E27FC236}">
+                <a16:creationId xmlns:a16="http://schemas.microsoft.com/office/drawing/2014/main" id="{A9D29847-B7FC-4C3A-94C4-3354DE85A51B}"/>
               </a:ext>
             </a:extLst>
           </p:cNvPr>
@@ -12835,8 +12907,8 @@
         </p:blipFill>
         <p:spPr>
           <a:xfrm>
-            <a:off x="7276266" y="4244228"/>
-            <a:ext cx="4410075" cy="1038225"/>
+            <a:off x="1266613" y="5393679"/>
+            <a:ext cx="3543300" cy="533400"/>
           </a:xfrm>
           <a:prstGeom prst="rect">
             <a:avLst/>
@@ -13537,10 +13609,10 @@
       </p:pic>
       <p:pic>
         <p:nvPicPr>
-          <p:cNvPr id="9" name="Image 8">
-            <a:extLst>
-              <a:ext uri="{FF2B5EF4-FFF2-40B4-BE49-F238E27FC236}">
-                <a16:creationId xmlns:a16="http://schemas.microsoft.com/office/drawing/2014/main" id="{BBCC97CC-8EA7-4053-9FDB-A6ACFB19EC1A}"/>
+          <p:cNvPr id="10" name="Image 9">
+            <a:extLst>
+              <a:ext uri="{FF2B5EF4-FFF2-40B4-BE49-F238E27FC236}">
+                <a16:creationId xmlns:a16="http://schemas.microsoft.com/office/drawing/2014/main" id="{5A6D4EDA-C682-4A33-B1A2-96F4007C0F32}"/>
               </a:ext>
             </a:extLst>
           </p:cNvPr>
@@ -13557,8 +13629,8 @@
         </p:blipFill>
         <p:spPr>
           <a:xfrm>
-            <a:off x="6316875" y="4112067"/>
-            <a:ext cx="5324475" cy="1323975"/>
+            <a:off x="6316875" y="5794150"/>
+            <a:ext cx="3248025" cy="809625"/>
           </a:xfrm>
           <a:prstGeom prst="rect">
             <a:avLst/>
@@ -13567,10 +13639,10 @@
       </p:pic>
       <p:pic>
         <p:nvPicPr>
-          <p:cNvPr id="10" name="Image 9">
-            <a:extLst>
-              <a:ext uri="{FF2B5EF4-FFF2-40B4-BE49-F238E27FC236}">
-                <a16:creationId xmlns:a16="http://schemas.microsoft.com/office/drawing/2014/main" id="{5A6D4EDA-C682-4A33-B1A2-96F4007C0F32}"/>
+          <p:cNvPr id="11" name="Image 10">
+            <a:extLst>
+              <a:ext uri="{FF2B5EF4-FFF2-40B4-BE49-F238E27FC236}">
+                <a16:creationId xmlns:a16="http://schemas.microsoft.com/office/drawing/2014/main" id="{A27ECA69-C5BD-47E3-9A35-D97090AAFC5F}"/>
               </a:ext>
             </a:extLst>
           </p:cNvPr>
@@ -13587,8 +13659,38 @@
         </p:blipFill>
         <p:spPr>
           <a:xfrm>
-            <a:off x="6316875" y="5794150"/>
-            <a:ext cx="3248025" cy="809625"/>
+            <a:off x="6316875" y="4112067"/>
+            <a:ext cx="4210050" cy="390525"/>
+          </a:xfrm>
+          <a:prstGeom prst="rect">
+            <a:avLst/>
+          </a:prstGeom>
+        </p:spPr>
+      </p:pic>
+      <p:pic>
+        <p:nvPicPr>
+          <p:cNvPr id="12" name="Image 11">
+            <a:extLst>
+              <a:ext uri="{FF2B5EF4-FFF2-40B4-BE49-F238E27FC236}">
+                <a16:creationId xmlns:a16="http://schemas.microsoft.com/office/drawing/2014/main" id="{C8BB86F1-3F58-4E32-BD06-0DE1BB175713}"/>
+              </a:ext>
+            </a:extLst>
+          </p:cNvPr>
+          <p:cNvPicPr>
+            <a:picLocks noChangeAspect="1"/>
+          </p:cNvPicPr>
+          <p:nvPr/>
+        </p:nvPicPr>
+        <p:blipFill>
+          <a:blip r:embed="rId6"/>
+          <a:stretch>
+            <a:fillRect/>
+          </a:stretch>
+        </p:blipFill>
+        <p:spPr>
+          <a:xfrm>
+            <a:off x="6316875" y="4616892"/>
+            <a:ext cx="4933950" cy="800100"/>
           </a:xfrm>
           <a:prstGeom prst="rect">
             <a:avLst/>

</xml_diff>

<commit_message>
tableau blanc session 4
</commit_message>
<xml_diff>
--- a/slides/03_04_mnist_basics.pptx
+++ b/slides/03_04_mnist_basics.pptx
@@ -125,7 +125,7 @@
 <file path=ppt/revisionInfo.xml><?xml version="1.0" encoding="utf-8"?>
 <p1510:revInfo xmlns:a="http://schemas.openxmlformats.org/drawingml/2006/main" xmlns:r="http://schemas.openxmlformats.org/officeDocument/2006/relationships" xmlns:p1510="http://schemas.microsoft.com/office/powerpoint/2015/10/main">
   <p1510:revLst>
-    <p1510:client id="{EEAA9421-7D29-4AE9-BD79-8FDD19F84FC2}" v="167" dt="2020-04-27T22:08:50.605"/>
+    <p1510:client id="{EEAA9421-7D29-4AE9-BD79-8FDD19F84FC2}" v="168" dt="2020-04-28T17:21:26.490"/>
   </p1510:revLst>
 </p1510:revInfo>
 </file>
@@ -1594,22 +1594,30 @@
   <pc:docChgLst>
     <pc:chgData name="Laurent Prud'hon" userId="196f0b5afced95ca" providerId="LiveId" clId="{EEAA9421-7D29-4AE9-BD79-8FDD19F84FC2}"/>
     <pc:docChg chg="undo redo custSel addSld delSld modSld sldOrd">
-      <pc:chgData name="Laurent Prud'hon" userId="196f0b5afced95ca" providerId="LiveId" clId="{EEAA9421-7D29-4AE9-BD79-8FDD19F84FC2}" dt="2020-04-27T22:09:23.840" v="3135" actId="1076"/>
+      <pc:chgData name="Laurent Prud'hon" userId="196f0b5afced95ca" providerId="LiveId" clId="{EEAA9421-7D29-4AE9-BD79-8FDD19F84FC2}" dt="2020-04-28T17:21:27.478" v="3139" actId="962"/>
       <pc:docMkLst>
         <pc:docMk/>
       </pc:docMkLst>
       <pc:sldChg chg="addSp delSp modSp">
-        <pc:chgData name="Laurent Prud'hon" userId="196f0b5afced95ca" providerId="LiveId" clId="{EEAA9421-7D29-4AE9-BD79-8FDD19F84FC2}" dt="2020-04-24T08:55:27.086" v="3" actId="962"/>
+        <pc:chgData name="Laurent Prud'hon" userId="196f0b5afced95ca" providerId="LiveId" clId="{EEAA9421-7D29-4AE9-BD79-8FDD19F84FC2}" dt="2020-04-28T17:21:27.478" v="3139" actId="962"/>
         <pc:sldMkLst>
           <pc:docMk/>
           <pc:sldMk cId="3510990267" sldId="256"/>
         </pc:sldMkLst>
-        <pc:picChg chg="add mod">
-          <ac:chgData name="Laurent Prud'hon" userId="196f0b5afced95ca" providerId="LiveId" clId="{EEAA9421-7D29-4AE9-BD79-8FDD19F84FC2}" dt="2020-04-24T08:55:27.086" v="3" actId="962"/>
+        <pc:picChg chg="add del mod">
+          <ac:chgData name="Laurent Prud'hon" userId="196f0b5afced95ca" providerId="LiveId" clId="{EEAA9421-7D29-4AE9-BD79-8FDD19F84FC2}" dt="2020-04-28T17:21:13.088" v="3136" actId="478"/>
           <ac:picMkLst>
             <pc:docMk/>
             <pc:sldMk cId="3510990267" sldId="256"/>
             <ac:picMk id="3" creationId="{CDA9ED71-663B-4E59-9AAA-F51333B2A3BE}"/>
+          </ac:picMkLst>
+        </pc:picChg>
+        <pc:picChg chg="add mod">
+          <ac:chgData name="Laurent Prud'hon" userId="196f0b5afced95ca" providerId="LiveId" clId="{EEAA9421-7D29-4AE9-BD79-8FDD19F84FC2}" dt="2020-04-28T17:21:27.478" v="3139" actId="962"/>
+          <ac:picMkLst>
+            <pc:docMk/>
+            <pc:sldMk cId="3510990267" sldId="256"/>
+            <ac:picMk id="4" creationId="{F9999BA9-87D6-46D3-A151-6069EE848CC2}"/>
           </ac:picMkLst>
         </pc:picChg>
         <pc:picChg chg="del">
@@ -3380,7 +3388,7 @@
           <a:p>
             <a:fld id="{57095F20-A69D-43E6-8B33-F742FF254E17}" type="datetimeFigureOut">
               <a:rPr lang="fr-FR" smtClean="0"/>
-              <a:t>27/04/2020</a:t>
+              <a:t>28/04/2020</a:t>
             </a:fld>
             <a:endParaRPr lang="fr-FR"/>
           </a:p>
@@ -3578,7 +3586,7 @@
           <a:p>
             <a:fld id="{57095F20-A69D-43E6-8B33-F742FF254E17}" type="datetimeFigureOut">
               <a:rPr lang="fr-FR" smtClean="0"/>
-              <a:t>27/04/2020</a:t>
+              <a:t>28/04/2020</a:t>
             </a:fld>
             <a:endParaRPr lang="fr-FR"/>
           </a:p>
@@ -3786,7 +3794,7 @@
           <a:p>
             <a:fld id="{57095F20-A69D-43E6-8B33-F742FF254E17}" type="datetimeFigureOut">
               <a:rPr lang="fr-FR" smtClean="0"/>
-              <a:t>27/04/2020</a:t>
+              <a:t>28/04/2020</a:t>
             </a:fld>
             <a:endParaRPr lang="fr-FR"/>
           </a:p>
@@ -3984,7 +3992,7 @@
           <a:p>
             <a:fld id="{57095F20-A69D-43E6-8B33-F742FF254E17}" type="datetimeFigureOut">
               <a:rPr lang="fr-FR" smtClean="0"/>
-              <a:t>27/04/2020</a:t>
+              <a:t>28/04/2020</a:t>
             </a:fld>
             <a:endParaRPr lang="fr-FR"/>
           </a:p>
@@ -4259,7 +4267,7 @@
           <a:p>
             <a:fld id="{57095F20-A69D-43E6-8B33-F742FF254E17}" type="datetimeFigureOut">
               <a:rPr lang="fr-FR" smtClean="0"/>
-              <a:t>27/04/2020</a:t>
+              <a:t>28/04/2020</a:t>
             </a:fld>
             <a:endParaRPr lang="fr-FR"/>
           </a:p>
@@ -4524,7 +4532,7 @@
           <a:p>
             <a:fld id="{57095F20-A69D-43E6-8B33-F742FF254E17}" type="datetimeFigureOut">
               <a:rPr lang="fr-FR" smtClean="0"/>
-              <a:t>27/04/2020</a:t>
+              <a:t>28/04/2020</a:t>
             </a:fld>
             <a:endParaRPr lang="fr-FR"/>
           </a:p>
@@ -4936,7 +4944,7 @@
           <a:p>
             <a:fld id="{57095F20-A69D-43E6-8B33-F742FF254E17}" type="datetimeFigureOut">
               <a:rPr lang="fr-FR" smtClean="0"/>
-              <a:t>27/04/2020</a:t>
+              <a:t>28/04/2020</a:t>
             </a:fld>
             <a:endParaRPr lang="fr-FR"/>
           </a:p>
@@ -5077,7 +5085,7 @@
           <a:p>
             <a:fld id="{57095F20-A69D-43E6-8B33-F742FF254E17}" type="datetimeFigureOut">
               <a:rPr lang="fr-FR" smtClean="0"/>
-              <a:t>27/04/2020</a:t>
+              <a:t>28/04/2020</a:t>
             </a:fld>
             <a:endParaRPr lang="fr-FR"/>
           </a:p>
@@ -5190,7 +5198,7 @@
           <a:p>
             <a:fld id="{57095F20-A69D-43E6-8B33-F742FF254E17}" type="datetimeFigureOut">
               <a:rPr lang="fr-FR" smtClean="0"/>
-              <a:t>27/04/2020</a:t>
+              <a:t>28/04/2020</a:t>
             </a:fld>
             <a:endParaRPr lang="fr-FR"/>
           </a:p>
@@ -5501,7 +5509,7 @@
           <a:p>
             <a:fld id="{57095F20-A69D-43E6-8B33-F742FF254E17}" type="datetimeFigureOut">
               <a:rPr lang="fr-FR" smtClean="0"/>
-              <a:t>27/04/2020</a:t>
+              <a:t>28/04/2020</a:t>
             </a:fld>
             <a:endParaRPr lang="fr-FR"/>
           </a:p>
@@ -5789,7 +5797,7 @@
           <a:p>
             <a:fld id="{57095F20-A69D-43E6-8B33-F742FF254E17}" type="datetimeFigureOut">
               <a:rPr lang="fr-FR" smtClean="0"/>
-              <a:t>27/04/2020</a:t>
+              <a:t>28/04/2020</a:t>
             </a:fld>
             <a:endParaRPr lang="fr-FR"/>
           </a:p>
@@ -6030,7 +6038,7 @@
           <a:p>
             <a:fld id="{57095F20-A69D-43E6-8B33-F742FF254E17}" type="datetimeFigureOut">
               <a:rPr lang="fr-FR" smtClean="0"/>
-              <a:t>27/04/2020</a:t>
+              <a:t>28/04/2020</a:t>
             </a:fld>
             <a:endParaRPr lang="fr-FR"/>
           </a:p>
@@ -6449,10 +6457,10 @@
       </p:grpSpPr>
       <p:pic>
         <p:nvPicPr>
-          <p:cNvPr id="3" name="Image 2" descr="Une image contenant photo, homme, femme, posant&#10;&#10;Description générée automatiquement">
-            <a:extLst>
-              <a:ext uri="{FF2B5EF4-FFF2-40B4-BE49-F238E27FC236}">
-                <a16:creationId xmlns:a16="http://schemas.microsoft.com/office/drawing/2014/main" id="{CDA9ED71-663B-4E59-9AAA-F51333B2A3BE}"/>
+          <p:cNvPr id="4" name="Image 3" descr="Une image contenant photo, homme, femme, posant&#10;&#10;Description générée automatiquement">
+            <a:extLst>
+              <a:ext uri="{FF2B5EF4-FFF2-40B4-BE49-F238E27FC236}">
+                <a16:creationId xmlns:a16="http://schemas.microsoft.com/office/drawing/2014/main" id="{F9999BA9-87D6-46D3-A151-6069EE848CC2}"/>
               </a:ext>
             </a:extLst>
           </p:cNvPr>

</xml_diff>